<commit_message>
Added "This is your class" to 'About'
</commit_message>
<xml_diff>
--- a/cybersecurity-iacs/slides/delivery/02__About-Cyber-IACS.pptx
+++ b/cybersecurity-iacs/slides/delivery/02__About-Cyber-IACS.pptx
@@ -21,6 +21,7 @@
     <p:sldId id="263" r:id="rId16"/>
     <p:sldId id="264" r:id="rId17"/>
     <p:sldId id="265" r:id="rId18"/>
+    <p:sldId id="266" r:id="rId19"/>
   </p:sldIdLst>
   <p:sldSz cx="9372600" cy="8297863"/>
   <p:notesSz cx="7315200" cy="9601200"/>
@@ -2502,6 +2503,128 @@
 </file>
 
 <file path=ppt/slides/slide10.xml><?xml version="1.0" encoding="utf-8"?>
+<p:sld xmlns:a="http://schemas.openxmlformats.org/drawingml/2006/main" xmlns:p="http://schemas.openxmlformats.org/presentationml/2006/main" xmlns:r="http://schemas.openxmlformats.org/officeDocument/2006/relationships">
+  <p:cSld>
+    <p:spTree>
+      <p:nvGrpSpPr>
+        <p:cNvPr id="1" name=""/>
+        <p:cNvGrpSpPr/>
+        <p:nvPr/>
+      </p:nvGrpSpPr>
+      <p:grpSpPr/>
+      <p:sp>
+        <p:nvSpPr>
+          <p:cNvPr id="2" name="Title 1"/>
+          <p:cNvSpPr>
+            <a:spLocks noGrp="1"/>
+          </p:cNvSpPr>
+          <p:nvPr>
+            <p:ph type="title"/>
+          </p:nvPr>
+        </p:nvSpPr>
+        <p:spPr/>
+        <p:txBody>
+          <a:bodyPr/>
+          <a:lstStyle/>
+          <a:p>
+            <a:r>
+              <a:t>Your class!</a:t>
+            </a:r>
+          </a:p>
+        </p:txBody>
+      </p:sp>
+      <p:sp>
+        <p:nvSpPr>
+          <p:cNvPr id="3" name="Content Placeholder 2"/>
+          <p:cNvSpPr>
+            <a:spLocks noGrp="1"/>
+          </p:cNvSpPr>
+          <p:nvPr>
+            <p:ph idx="1"/>
+          </p:nvPr>
+        </p:nvSpPr>
+        <p:spPr/>
+        <p:txBody>
+          <a:bodyPr/>
+          <a:lstStyle/>
+          <a:p>
+            <a:r>
+              <a:t> Yes, this is your class. What does this mean? You define the value.</a:t>
+            </a:r>
+          </a:p>
+          <a:p>
+            <a:r>
+              <a:t> What is the most important ingredient of class – your participation!</a:t>
+            </a:r>
+          </a:p>
+          <a:p>
+            <a:r>
+              <a:t> Your feedback and questions are always welcomed.</a:t>
+            </a:r>
+          </a:p>
+          <a:p>
+            <a:r>
+              <a:t> There is no protocol in class. Speak up anytime!</a:t>
+            </a:r>
+          </a:p>
+          <a:p>
+            <a:r>
+              <a:t> We value your comments during and after class. Just email</a:t>
+            </a:r>
+            <a:r>
+              <a:rPr>
+                <a:latin typeface="Courier New"/>
+              </a:rPr>
+              <a:t> mark@elephantscale.com</a:t>
+            </a:r>
+            <a:r>
+              <a:t> .</a:t>
+            </a:r>
+          </a:p>
+        </p:txBody>
+      </p:sp>
+      <p:sp>
+        <p:nvSpPr>
+          <p:cNvPr id="4" name="TextBox 3"/>
+          <p:cNvSpPr txBox="1"/>
+          <p:nvPr/>
+        </p:nvSpPr>
+        <p:spPr>
+          <a:xfrm>
+            <a:off x="704088" y="8065008"/>
+            <a:ext cx="8915400" cy="228600"/>
+          </a:xfrm>
+          <a:prstGeom prst="rect">
+            <a:avLst/>
+          </a:prstGeom>
+          <a:noFill/>
+        </p:spPr>
+        <p:txBody>
+          <a:bodyPr wrap="none">
+            <a:spAutoFit/>
+          </a:bodyPr>
+          <a:lstStyle/>
+          <a:p>
+            <a:r>
+              <a:rPr sz="800">
+                <a:solidFill>
+                  <a:srgbClr val="000000"/>
+                </a:solidFill>
+              </a:rPr>
+              <a:t>Copyright © 2021 by Elephant Scale, All Rights Reserved</a:t>
+            </a:r>
+          </a:p>
+        </p:txBody>
+      </p:sp>
+    </p:spTree>
+  </p:cSld>
+  <p:clrMapOvr>
+    <a:masterClrMapping/>
+  </p:clrMapOvr>
+</p:sld>
+</file>
+
+<file path=ppt/slides/slide11.xml><?xml version="1.0" encoding="utf-8"?>
 <p:sld xmlns:a="http://schemas.openxmlformats.org/drawingml/2006/main" xmlns:p="http://schemas.openxmlformats.org/presentationml/2006/main" xmlns:r="http://schemas.openxmlformats.org/officeDocument/2006/relationships">
   <p:cSld>
     <p:spTree>

</xml_diff>